<commit_message>
OB API for Saturn nit
</commit_message>
<xml_diff>
--- a/saturn/openbanking-api-for-saturn.pptx
+++ b/saturn/openbanking-api-for-saturn.pptx
@@ -4143,19 +4143,11 @@
             </a:r>
             <a:r>
               <a:rPr lang="en-US" sz="1200" dirty="0"/>
-              <a:t>. However, due to expensive TTP </a:t>
-            </a:r>
-            <a:r>
-              <a:rPr lang="en-US" sz="1200"/>
-              <a:t>certification </a:t>
-            </a:r>
-            <a:r>
-              <a:rPr lang="en-US" sz="1200" smtClean="0"/>
-              <a:t>schemes </a:t>
+              <a:t>. However, due to expensive TTP certification </a:t>
             </a:r>
             <a:r>
               <a:rPr lang="en-US" sz="1200" dirty="0" smtClean="0"/>
-              <a:t>as </a:t>
+              <a:t>schemes as </a:t>
             </a:r>
             <a:r>
               <a:rPr lang="en-US" sz="1200" dirty="0"/>
@@ -4167,7 +4159,23 @@
             </a:r>
             <a:r>
               <a:rPr lang="en-US" sz="1200" dirty="0"/>
-              <a:t>an entirely undefined client environment ("Wallet"), it would effectively require a new VISA to scale which probably were not the </a:t>
+              <a:t>an entirely undefined client environment </a:t>
+            </a:r>
+            <a:r>
+              <a:rPr lang="en-US" sz="1200" dirty="0" smtClean="0"/>
+              <a:t>(“Wallet</a:t>
+            </a:r>
+            <a:r>
+              <a:rPr lang="en-US" sz="1200" dirty="0" smtClean="0"/>
+              <a:t>”</a:t>
+            </a:r>
+            <a:r>
+              <a:rPr lang="en-US" sz="1200" dirty="0" smtClean="0"/>
+              <a:t>), </a:t>
+            </a:r>
+            <a:r>
+              <a:rPr lang="en-US" sz="1200" dirty="0"/>
+              <a:t>it would effectively require a new VISA to scale which probably were not the </a:t>
             </a:r>
             <a:r>
               <a:rPr lang="en-US" sz="1200" dirty="0" smtClean="0"/>
@@ -4213,7 +4221,15 @@
             </a:r>
             <a:r>
               <a:rPr lang="en-US" sz="1200" dirty="0" smtClean="0"/>
-              <a:t>(including “Wallet), dedicated for </a:t>
+              <a:t>(including “</a:t>
+            </a:r>
+            <a:r>
+              <a:rPr lang="en-US" sz="1200" dirty="0" smtClean="0"/>
+              <a:t>Wallet”), </a:t>
+            </a:r>
+            <a:r>
+              <a:rPr lang="en-US" sz="1200" i="1" dirty="0" smtClean="0"/>
+              <a:t>dedicated for </a:t>
             </a:r>
             <a:r>
               <a:rPr lang="en-US" sz="1200" i="1" dirty="0"/>

</xml_diff>

<commit_message>
OB API for Saturn update
</commit_message>
<xml_diff>
--- a/saturn/openbanking-api-for-saturn.pptx
+++ b/saturn/openbanking-api-for-saturn.pptx
@@ -288,7 +288,7 @@
           <a:p>
             <a:fld id="{487FC4E9-77CD-4C2A-BF4D-150A82B34D6E}" type="datetimeFigureOut">
               <a:rPr lang="en-US" smtClean="0"/>
-              <a:t>2019-05-26</a:t>
+              <a:t>2019-05-27</a:t>
             </a:fld>
             <a:endParaRPr lang="en-US"/>
           </a:p>
@@ -458,7 +458,7 @@
           <a:p>
             <a:fld id="{487FC4E9-77CD-4C2A-BF4D-150A82B34D6E}" type="datetimeFigureOut">
               <a:rPr lang="en-US" smtClean="0"/>
-              <a:t>2019-05-26</a:t>
+              <a:t>2019-05-27</a:t>
             </a:fld>
             <a:endParaRPr lang="en-US"/>
           </a:p>
@@ -638,7 +638,7 @@
           <a:p>
             <a:fld id="{487FC4E9-77CD-4C2A-BF4D-150A82B34D6E}" type="datetimeFigureOut">
               <a:rPr lang="en-US" smtClean="0"/>
-              <a:t>2019-05-26</a:t>
+              <a:t>2019-05-27</a:t>
             </a:fld>
             <a:endParaRPr lang="en-US"/>
           </a:p>
@@ -808,7 +808,7 @@
           <a:p>
             <a:fld id="{487FC4E9-77CD-4C2A-BF4D-150A82B34D6E}" type="datetimeFigureOut">
               <a:rPr lang="en-US" smtClean="0"/>
-              <a:t>2019-05-26</a:t>
+              <a:t>2019-05-27</a:t>
             </a:fld>
             <a:endParaRPr lang="en-US"/>
           </a:p>
@@ -1054,7 +1054,7 @@
           <a:p>
             <a:fld id="{487FC4E9-77CD-4C2A-BF4D-150A82B34D6E}" type="datetimeFigureOut">
               <a:rPr lang="en-US" smtClean="0"/>
-              <a:t>2019-05-26</a:t>
+              <a:t>2019-05-27</a:t>
             </a:fld>
             <a:endParaRPr lang="en-US"/>
           </a:p>
@@ -1342,7 +1342,7 @@
           <a:p>
             <a:fld id="{487FC4E9-77CD-4C2A-BF4D-150A82B34D6E}" type="datetimeFigureOut">
               <a:rPr lang="en-US" smtClean="0"/>
-              <a:t>2019-05-26</a:t>
+              <a:t>2019-05-27</a:t>
             </a:fld>
             <a:endParaRPr lang="en-US"/>
           </a:p>
@@ -1764,7 +1764,7 @@
           <a:p>
             <a:fld id="{487FC4E9-77CD-4C2A-BF4D-150A82B34D6E}" type="datetimeFigureOut">
               <a:rPr lang="en-US" smtClean="0"/>
-              <a:t>2019-05-26</a:t>
+              <a:t>2019-05-27</a:t>
             </a:fld>
             <a:endParaRPr lang="en-US"/>
           </a:p>
@@ -1882,7 +1882,7 @@
           <a:p>
             <a:fld id="{487FC4E9-77CD-4C2A-BF4D-150A82B34D6E}" type="datetimeFigureOut">
               <a:rPr lang="en-US" smtClean="0"/>
-              <a:t>2019-05-26</a:t>
+              <a:t>2019-05-27</a:t>
             </a:fld>
             <a:endParaRPr lang="en-US"/>
           </a:p>
@@ -1977,7 +1977,7 @@
           <a:p>
             <a:fld id="{487FC4E9-77CD-4C2A-BF4D-150A82B34D6E}" type="datetimeFigureOut">
               <a:rPr lang="en-US" smtClean="0"/>
-              <a:t>2019-05-26</a:t>
+              <a:t>2019-05-27</a:t>
             </a:fld>
             <a:endParaRPr lang="en-US"/>
           </a:p>
@@ -2254,7 +2254,7 @@
           <a:p>
             <a:fld id="{487FC4E9-77CD-4C2A-BF4D-150A82B34D6E}" type="datetimeFigureOut">
               <a:rPr lang="en-US" smtClean="0"/>
-              <a:t>2019-05-26</a:t>
+              <a:t>2019-05-27</a:t>
             </a:fld>
             <a:endParaRPr lang="en-US"/>
           </a:p>
@@ -2507,7 +2507,7 @@
           <a:p>
             <a:fld id="{487FC4E9-77CD-4C2A-BF4D-150A82B34D6E}" type="datetimeFigureOut">
               <a:rPr lang="en-US" smtClean="0"/>
-              <a:t>2019-05-26</a:t>
+              <a:t>2019-05-27</a:t>
             </a:fld>
             <a:endParaRPr lang="en-US"/>
           </a:p>
@@ -2720,7 +2720,7 @@
           <a:p>
             <a:fld id="{487FC4E9-77CD-4C2A-BF4D-150A82B34D6E}" type="datetimeFigureOut">
               <a:rPr lang="en-US" smtClean="0"/>
-              <a:t>2019-05-26</a:t>
+              <a:t>2019-05-27</a:t>
             </a:fld>
             <a:endParaRPr lang="en-US"/>
           </a:p>
@@ -4084,7 +4084,7 @@
         <p:spPr>
           <a:xfrm>
             <a:off x="945807" y="404664"/>
-            <a:ext cx="7298601" cy="584775"/>
+            <a:ext cx="7436459" cy="584775"/>
           </a:xfrm>
           <a:prstGeom prst="rect">
             <a:avLst/>
@@ -4102,7 +4102,28 @@
                 <a:latin typeface="Times New Roman" panose="02020603050405020304" pitchFamily="18" charset="0"/>
                 <a:cs typeface="Times New Roman" panose="02020603050405020304" pitchFamily="18" charset="0"/>
               </a:rPr>
-              <a:t>Extending the reach of Open Banking APIs</a:t>
+              <a:t>Extending </a:t>
+            </a:r>
+            <a:r>
+              <a:rPr lang="en-US" sz="3200" smtClean="0">
+                <a:latin typeface="Times New Roman" panose="02020603050405020304" pitchFamily="18" charset="0"/>
+                <a:cs typeface="Times New Roman" panose="02020603050405020304" pitchFamily="18" charset="0"/>
+              </a:rPr>
+              <a:t>the </a:t>
+            </a:r>
+            <a:r>
+              <a:rPr lang="en-US" sz="3200" smtClean="0">
+                <a:latin typeface="Times New Roman" panose="02020603050405020304" pitchFamily="18" charset="0"/>
+                <a:cs typeface="Times New Roman" panose="02020603050405020304" pitchFamily="18" charset="0"/>
+              </a:rPr>
+              <a:t>Reach </a:t>
+            </a:r>
+            <a:r>
+              <a:rPr lang="en-US" sz="3200" dirty="0" smtClean="0">
+                <a:latin typeface="Times New Roman" panose="02020603050405020304" pitchFamily="18" charset="0"/>
+                <a:cs typeface="Times New Roman" panose="02020603050405020304" pitchFamily="18" charset="0"/>
+              </a:rPr>
+              <a:t>of Open Banking APIs</a:t>
             </a:r>
             <a:endParaRPr lang="en-US" sz="3200" dirty="0">
               <a:latin typeface="Times New Roman" panose="02020603050405020304" pitchFamily="18" charset="0"/>
@@ -4163,15 +4184,7 @@
             </a:r>
             <a:r>
               <a:rPr lang="en-US" sz="1200" dirty="0" smtClean="0"/>
-              <a:t>(“Wallet</a:t>
-            </a:r>
-            <a:r>
-              <a:rPr lang="en-US" sz="1200" dirty="0" smtClean="0"/>
-              <a:t>”</a:t>
-            </a:r>
-            <a:r>
-              <a:rPr lang="en-US" sz="1200" dirty="0" smtClean="0"/>
-              <a:t>), </a:t>
+              <a:t>(“Wallet”), </a:t>
             </a:r>
             <a:r>
               <a:rPr lang="en-US" sz="1200" dirty="0"/>
@@ -4221,11 +4234,7 @@
             </a:r>
             <a:r>
               <a:rPr lang="en-US" sz="1200" dirty="0" smtClean="0"/>
-              <a:t>(including “</a:t>
-            </a:r>
-            <a:r>
-              <a:rPr lang="en-US" sz="1200" dirty="0" smtClean="0"/>
-              <a:t>Wallet”), </a:t>
+              <a:t>(including “Wallet”), </a:t>
             </a:r>
             <a:r>
               <a:rPr lang="en-US" sz="1200" i="1" dirty="0" smtClean="0"/>

</xml_diff>